<commit_message>
presentation changes, "script" added
</commit_message>
<xml_diff>
--- a/Presentation/TDD.pptx
+++ b/Presentation/TDD.pptx
@@ -112,6 +112,11 @@
       </a:defRPr>
     </a:lvl9pPr>
   </p:defaultTextStyle>
+  <p:extLst>
+    <p:ext uri="{EFAFB233-063F-42B5-8137-9DF3F51BA10A}">
+      <p15:sldGuideLst xmlns:p15="http://schemas.microsoft.com/office/powerpoint/2012/main"/>
+    </p:ext>
+  </p:extLst>
 </p:presentation>
 </file>
 
@@ -298,7 +303,7 @@
           <a:p>
             <a:fld id="{CC8BA3E7-3651-44A9-88B0-F85FF4184ABB}" type="datetimeFigureOut">
               <a:rPr lang="en-GB" smtClean="0"/>
-              <a:t>21/02/2018</a:t>
+              <a:t>26/02/2018</a:t>
             </a:fld>
             <a:endParaRPr lang="en-GB"/>
           </a:p>
@@ -573,7 +578,7 @@
           <a:p>
             <a:fld id="{CC8BA3E7-3651-44A9-88B0-F85FF4184ABB}" type="datetimeFigureOut">
               <a:rPr lang="en-GB" smtClean="0"/>
-              <a:t>21/02/2018</a:t>
+              <a:t>26/02/2018</a:t>
             </a:fld>
             <a:endParaRPr lang="en-GB"/>
           </a:p>
@@ -767,7 +772,7 @@
           <a:p>
             <a:fld id="{CC8BA3E7-3651-44A9-88B0-F85FF4184ABB}" type="datetimeFigureOut">
               <a:rPr lang="en-GB" smtClean="0"/>
-              <a:t>21/02/2018</a:t>
+              <a:t>26/02/2018</a:t>
             </a:fld>
             <a:endParaRPr lang="en-GB"/>
           </a:p>
@@ -1035,7 +1040,7 @@
           <a:p>
             <a:fld id="{CC8BA3E7-3651-44A9-88B0-F85FF4184ABB}" type="datetimeFigureOut">
               <a:rPr lang="en-GB" smtClean="0"/>
-              <a:t>21/02/2018</a:t>
+              <a:t>26/02/2018</a:t>
             </a:fld>
             <a:endParaRPr lang="en-GB"/>
           </a:p>
@@ -1367,7 +1372,7 @@
           <a:p>
             <a:fld id="{CC8BA3E7-3651-44A9-88B0-F85FF4184ABB}" type="datetimeFigureOut">
               <a:rPr lang="en-GB" smtClean="0"/>
-              <a:t>21/02/2018</a:t>
+              <a:t>26/02/2018</a:t>
             </a:fld>
             <a:endParaRPr lang="en-GB"/>
           </a:p>
@@ -1977,7 +1982,7 @@
           <a:p>
             <a:fld id="{CC8BA3E7-3651-44A9-88B0-F85FF4184ABB}" type="datetimeFigureOut">
               <a:rPr lang="en-GB" smtClean="0"/>
-              <a:t>21/02/2018</a:t>
+              <a:t>26/02/2018</a:t>
             </a:fld>
             <a:endParaRPr lang="en-GB"/>
           </a:p>
@@ -2824,7 +2829,7 @@
           <a:p>
             <a:fld id="{CC8BA3E7-3651-44A9-88B0-F85FF4184ABB}" type="datetimeFigureOut">
               <a:rPr lang="en-GB" smtClean="0"/>
-              <a:t>21/02/2018</a:t>
+              <a:t>26/02/2018</a:t>
             </a:fld>
             <a:endParaRPr lang="en-GB"/>
           </a:p>
@@ -2994,7 +2999,7 @@
           <a:p>
             <a:fld id="{CC8BA3E7-3651-44A9-88B0-F85FF4184ABB}" type="datetimeFigureOut">
               <a:rPr lang="en-GB" smtClean="0"/>
-              <a:t>21/02/2018</a:t>
+              <a:t>26/02/2018</a:t>
             </a:fld>
             <a:endParaRPr lang="en-GB"/>
           </a:p>
@@ -3174,7 +3179,7 @@
           <a:p>
             <a:fld id="{CC8BA3E7-3651-44A9-88B0-F85FF4184ABB}" type="datetimeFigureOut">
               <a:rPr lang="en-GB" smtClean="0"/>
-              <a:t>21/02/2018</a:t>
+              <a:t>26/02/2018</a:t>
             </a:fld>
             <a:endParaRPr lang="en-GB"/>
           </a:p>
@@ -3344,7 +3349,7 @@
           <a:p>
             <a:fld id="{CC8BA3E7-3651-44A9-88B0-F85FF4184ABB}" type="datetimeFigureOut">
               <a:rPr lang="en-GB" smtClean="0"/>
-              <a:t>21/02/2018</a:t>
+              <a:t>26/02/2018</a:t>
             </a:fld>
             <a:endParaRPr lang="en-GB"/>
           </a:p>
@@ -3588,7 +3593,7 @@
           <a:p>
             <a:fld id="{CC8BA3E7-3651-44A9-88B0-F85FF4184ABB}" type="datetimeFigureOut">
               <a:rPr lang="en-GB" smtClean="0"/>
-              <a:t>21/02/2018</a:t>
+              <a:t>26/02/2018</a:t>
             </a:fld>
             <a:endParaRPr lang="en-GB"/>
           </a:p>
@@ -3880,7 +3885,7 @@
           <a:p>
             <a:fld id="{CC8BA3E7-3651-44A9-88B0-F85FF4184ABB}" type="datetimeFigureOut">
               <a:rPr lang="en-GB" smtClean="0"/>
-              <a:t>21/02/2018</a:t>
+              <a:t>26/02/2018</a:t>
             </a:fld>
             <a:endParaRPr lang="en-GB"/>
           </a:p>
@@ -4318,7 +4323,7 @@
           <a:p>
             <a:fld id="{CC8BA3E7-3651-44A9-88B0-F85FF4184ABB}" type="datetimeFigureOut">
               <a:rPr lang="en-GB" smtClean="0"/>
-              <a:t>21/02/2018</a:t>
+              <a:t>26/02/2018</a:t>
             </a:fld>
             <a:endParaRPr lang="en-GB"/>
           </a:p>
@@ -4436,7 +4441,7 @@
           <a:p>
             <a:fld id="{CC8BA3E7-3651-44A9-88B0-F85FF4184ABB}" type="datetimeFigureOut">
               <a:rPr lang="en-GB" smtClean="0"/>
-              <a:t>21/02/2018</a:t>
+              <a:t>26/02/2018</a:t>
             </a:fld>
             <a:endParaRPr lang="en-GB"/>
           </a:p>
@@ -4531,7 +4536,7 @@
           <a:p>
             <a:fld id="{CC8BA3E7-3651-44A9-88B0-F85FF4184ABB}" type="datetimeFigureOut">
               <a:rPr lang="en-GB" smtClean="0"/>
-              <a:t>21/02/2018</a:t>
+              <a:t>26/02/2018</a:t>
             </a:fld>
             <a:endParaRPr lang="en-GB"/>
           </a:p>
@@ -4810,7 +4815,7 @@
           <a:p>
             <a:fld id="{CC8BA3E7-3651-44A9-88B0-F85FF4184ABB}" type="datetimeFigureOut">
               <a:rPr lang="en-GB" smtClean="0"/>
-              <a:t>21/02/2018</a:t>
+              <a:t>26/02/2018</a:t>
             </a:fld>
             <a:endParaRPr lang="en-GB"/>
           </a:p>
@@ -5085,7 +5090,7 @@
           <a:p>
             <a:fld id="{CC8BA3E7-3651-44A9-88B0-F85FF4184ABB}" type="datetimeFigureOut">
               <a:rPr lang="en-GB" smtClean="0"/>
-              <a:t>21/02/2018</a:t>
+              <a:t>26/02/2018</a:t>
             </a:fld>
             <a:endParaRPr lang="en-GB"/>
           </a:p>
@@ -5514,7 +5519,7 @@
           <a:p>
             <a:fld id="{CC8BA3E7-3651-44A9-88B0-F85FF4184ABB}" type="datetimeFigureOut">
               <a:rPr lang="en-GB" smtClean="0"/>
-              <a:t>21/02/2018</a:t>
+              <a:t>26/02/2018</a:t>
             </a:fld>
             <a:endParaRPr lang="en-GB"/>
           </a:p>
@@ -6497,10 +6502,10 @@
               <a:buNone/>
             </a:pPr>
             <a:r>
-              <a:rPr lang="es-ES" dirty="0" err="1" smtClean="0"/>
+              <a:rPr lang="es-ES" sz="2400" dirty="0" err="1" smtClean="0"/>
               <a:t>Similarities</a:t>
             </a:r>
-            <a:endParaRPr lang="es-ES" dirty="0" smtClean="0"/>
+            <a:endParaRPr lang="es-ES" sz="2400" dirty="0" smtClean="0"/>
           </a:p>
           <a:p>
             <a:r>
@@ -6656,8 +6661,8 @@
         </p:nvSpPr>
         <p:spPr>
           <a:xfrm>
-            <a:off x="1103312" y="4515439"/>
-            <a:ext cx="9671901" cy="1593130"/>
+            <a:off x="1103312" y="5368140"/>
+            <a:ext cx="9671901" cy="1113125"/>
           </a:xfrm>
           <a:prstGeom prst="rect">
             <a:avLst/>
@@ -6669,34 +6674,6 @@
             <a:spAutoFit/>
           </a:bodyPr>
           <a:lstStyle/>
-          <a:p>
-            <a:pPr lvl="0">
-              <a:spcBef>
-                <a:spcPts val="1000"/>
-              </a:spcBef>
-              <a:buClr>
-                <a:srgbClr val="ACD433"/>
-              </a:buClr>
-              <a:buSzPct val="80000"/>
-            </a:pPr>
-            <a:r>
-              <a:rPr lang="es-ES" sz="2000" dirty="0" err="1">
-                <a:solidFill>
-                  <a:prstClr val="white"/>
-                </a:solidFill>
-                <a:ea typeface="+mj-ea"/>
-                <a:cs typeface="+mj-cs"/>
-              </a:rPr>
-              <a:t>Differences</a:t>
-            </a:r>
-            <a:endParaRPr lang="es-ES" sz="2000" dirty="0">
-              <a:solidFill>
-                <a:prstClr val="white"/>
-              </a:solidFill>
-              <a:ea typeface="+mj-ea"/>
-              <a:cs typeface="+mj-cs"/>
-            </a:endParaRPr>
-          </a:p>
           <a:p>
             <a:pPr marL="342900" lvl="0" indent="-342900">
               <a:spcBef>
@@ -6710,7 +6687,7 @@
               <a:buChar char=""/>
             </a:pPr>
             <a:r>
-              <a:rPr lang="es-ES" sz="2000" dirty="0" err="1">
+              <a:rPr lang="es-ES" sz="2000" dirty="0" err="1" smtClean="0">
                 <a:solidFill>
                   <a:prstClr val="white"/>
                 </a:solidFill>
@@ -6720,7 +6697,7 @@
               <a:t>Designer</a:t>
             </a:r>
             <a:r>
-              <a:rPr lang="es-ES" sz="2000" dirty="0">
+              <a:rPr lang="es-ES" sz="2000" dirty="0" smtClean="0">
                 <a:solidFill>
                   <a:prstClr val="white"/>
                 </a:solidFill>
@@ -7007,7 +6984,47 @@
                 <a:ea typeface="+mj-ea"/>
                 <a:cs typeface="+mj-cs"/>
               </a:rPr>
-              <a:t>works</a:t>
+              <a:t>w</a:t>
+            </a:r>
+            <a:r>
+              <a:rPr lang="es-ES" sz="2000" dirty="0" err="1" smtClean="0">
+                <a:solidFill>
+                  <a:prstClr val="white"/>
+                </a:solidFill>
+                <a:ea typeface="+mj-ea"/>
+                <a:cs typeface="+mj-cs"/>
+              </a:rPr>
+              <a:t>orks</a:t>
+            </a:r>
+            <a:r>
+              <a:rPr lang="es-ES" sz="2000" dirty="0" smtClean="0">
+                <a:solidFill>
+                  <a:prstClr val="white"/>
+                </a:solidFill>
+                <a:ea typeface="+mj-ea"/>
+                <a:cs typeface="+mj-cs"/>
+              </a:rPr>
+              <a:t> and </a:t>
+            </a:r>
+            <a:r>
+              <a:rPr lang="es-ES" sz="2000" dirty="0" err="1" smtClean="0">
+                <a:solidFill>
+                  <a:prstClr val="white"/>
+                </a:solidFill>
+                <a:ea typeface="+mj-ea"/>
+                <a:cs typeface="+mj-cs"/>
+              </a:rPr>
+              <a:t>needs</a:t>
+            </a:r>
+            <a:r>
+              <a:rPr lang="es-ES" sz="2000" dirty="0" smtClean="0">
+                <a:solidFill>
+                  <a:prstClr val="white"/>
+                </a:solidFill>
+                <a:ea typeface="+mj-ea"/>
+                <a:cs typeface="+mj-cs"/>
+              </a:rPr>
+              <a:t> to be done</a:t>
             </a:r>
             <a:endParaRPr lang="es-ES" sz="2000" dirty="0">
               <a:solidFill>
@@ -7019,6 +7036,44 @@
           </a:p>
           <a:p>
             <a:endParaRPr lang="en-GB" dirty="0"/>
+          </a:p>
+        </p:txBody>
+      </p:sp>
+      <p:sp>
+        <p:nvSpPr>
+          <p:cNvPr id="5" name="CuadroTexto 4"/>
+          <p:cNvSpPr txBox="1"/>
+          <p:nvPr/>
+        </p:nvSpPr>
+        <p:spPr>
+          <a:xfrm>
+            <a:off x="1103312" y="4896327"/>
+            <a:ext cx="3992390" cy="400110"/>
+          </a:xfrm>
+          <a:prstGeom prst="rect">
+            <a:avLst/>
+          </a:prstGeom>
+          <a:noFill/>
+        </p:spPr>
+        <p:txBody>
+          <a:bodyPr wrap="square" rtlCol="0">
+            <a:spAutoFit/>
+          </a:bodyPr>
+          <a:lstStyle/>
+          <a:p>
+            <a:r>
+              <a:rPr lang="es-ES" sz="2000" dirty="0" err="1" smtClean="0"/>
+              <a:t>Diferences</a:t>
+            </a:r>
+            <a:r>
+              <a:rPr lang="es-ES" sz="2000" dirty="0"/>
+              <a:t> </a:t>
+            </a:r>
+            <a:r>
+              <a:rPr lang="es-ES" sz="2000" dirty="0" smtClean="0"/>
+              <a:t>?</a:t>
+            </a:r>
+            <a:endParaRPr lang="en-GB" sz="2000" dirty="0"/>
           </a:p>
         </p:txBody>
       </p:sp>
@@ -7177,7 +7232,7 @@
                                           </p:stCondLst>
                                         </p:cTn>
                                         <p:tgtEl>
-                                          <p:spTgt spid="7"/>
+                                          <p:spTgt spid="5"/>
                                         </p:tgtEl>
                                         <p:attrNameLst>
                                           <p:attrName>style.visibility</p:attrName>
@@ -7209,7 +7264,7 @@
                             </p:stCondLst>
                             <p:childTnLst>
                               <p:par>
-                                <p:cTn id="17" presetID="1" presetClass="entr" presetSubtype="0" fill="hold" nodeType="clickEffect">
+                                <p:cTn id="17" presetID="1" presetClass="entr" presetSubtype="0" fill="hold" grpId="0" nodeType="clickEffect">
                                   <p:stCondLst>
                                     <p:cond delay="0"/>
                                   </p:stCondLst>
@@ -7217,6 +7272,51 @@
                                     <p:set>
                                       <p:cBhvr>
                                         <p:cTn id="18" dur="1" fill="hold">
+                                          <p:stCondLst>
+                                            <p:cond delay="0"/>
+                                          </p:stCondLst>
+                                        </p:cTn>
+                                        <p:tgtEl>
+                                          <p:spTgt spid="7"/>
+                                        </p:tgtEl>
+                                        <p:attrNameLst>
+                                          <p:attrName>style.visibility</p:attrName>
+                                        </p:attrNameLst>
+                                      </p:cBhvr>
+                                      <p:to>
+                                        <p:strVal val="visible"/>
+                                      </p:to>
+                                    </p:set>
+                                  </p:childTnLst>
+                                </p:cTn>
+                              </p:par>
+                            </p:childTnLst>
+                          </p:cTn>
+                        </p:par>
+                      </p:childTnLst>
+                    </p:cTn>
+                  </p:par>
+                  <p:par>
+                    <p:cTn id="19" fill="hold">
+                      <p:stCondLst>
+                        <p:cond delay="indefinite"/>
+                      </p:stCondLst>
+                      <p:childTnLst>
+                        <p:par>
+                          <p:cTn id="20" fill="hold">
+                            <p:stCondLst>
+                              <p:cond delay="0"/>
+                            </p:stCondLst>
+                            <p:childTnLst>
+                              <p:par>
+                                <p:cTn id="21" presetID="1" presetClass="entr" presetSubtype="0" fill="hold" nodeType="clickEffect">
+                                  <p:stCondLst>
+                                    <p:cond delay="0"/>
+                                  </p:stCondLst>
+                                  <p:childTnLst>
+                                    <p:set>
+                                      <p:cBhvr>
+                                        <p:cTn id="22" dur="1" fill="hold">
                                           <p:stCondLst>
                                             <p:cond delay="0"/>
                                           </p:stCondLst>
@@ -7263,8 +7363,9 @@
       </p:par>
     </p:tnLst>
     <p:bldLst>
-      <p:bldP spid="3" grpId="0" uiExpand="1" build="p"/>
+      <p:bldP spid="3" grpId="0" build="p"/>
       <p:bldP spid="7" grpId="0"/>
+      <p:bldP spid="5" grpId="0"/>
     </p:bldLst>
   </p:timing>
 </p:sld>
@@ -7980,7 +8081,7 @@
         </p:blipFill>
         <p:spPr>
           <a:xfrm>
-            <a:off x="5889220" y="1208293"/>
+            <a:off x="8157469" y="1293158"/>
             <a:ext cx="2857500" cy="2857500"/>
           </a:xfrm>
           <a:prstGeom prst="rect">
@@ -7990,14 +8091,44 @@
       </p:pic>
       <p:pic>
         <p:nvPicPr>
-          <p:cNvPr id="3076" name="Picture 4" descr="https://i.gyazo.com/e4e4c652fe20f544c260dfdd7354b5a7.png"/>
+          <p:cNvPr id="9" name="Imagen 8"/>
+          <p:cNvPicPr>
+            <a:picLocks noChangeAspect="1"/>
+          </p:cNvPicPr>
+          <p:nvPr/>
+        </p:nvPicPr>
+        <p:blipFill>
+          <a:blip r:embed="rId3">
+            <a:extLst>
+              <a:ext uri="{28A0092B-C50C-407E-A947-70E740481C1C}">
+                <a14:useLocalDpi xmlns:a14="http://schemas.microsoft.com/office/drawing/2010/main" val="0"/>
+              </a:ext>
+            </a:extLst>
+          </a:blip>
+          <a:stretch>
+            <a:fillRect/>
+          </a:stretch>
+        </p:blipFill>
+        <p:spPr>
+          <a:xfrm>
+            <a:off x="4876722" y="1293158"/>
+            <a:ext cx="2857500" cy="2857500"/>
+          </a:xfrm>
+          <a:prstGeom prst="rect">
+            <a:avLst/>
+          </a:prstGeom>
+        </p:spPr>
+      </p:pic>
+      <p:pic>
+        <p:nvPicPr>
+          <p:cNvPr id="1028" name="Picture 4" descr="https://i.gyazo.com/8039886b37aaaadb90fff02e6f70e667.png"/>
           <p:cNvPicPr>
             <a:picLocks noChangeAspect="1" noChangeArrowheads="1"/>
           </p:cNvPicPr>
           <p:nvPr/>
         </p:nvPicPr>
         <p:blipFill>
-          <a:blip r:embed="rId3">
+          <a:blip r:embed="rId4" cstate="print">
             <a:extLst>
               <a:ext uri="{28A0092B-C50C-407E-A947-70E740481C1C}">
                 <a14:useLocalDpi xmlns:a14="http://schemas.microsoft.com/office/drawing/2010/main" val="0"/>
@@ -8011,8 +8142,8 @@
         </p:blipFill>
         <p:spPr bwMode="auto">
           <a:xfrm>
-            <a:off x="4603345" y="4814196"/>
-            <a:ext cx="5429250" cy="685800"/>
+            <a:off x="6056249" y="4917593"/>
+            <a:ext cx="3355946" cy="1330806"/>
           </a:xfrm>
           <a:prstGeom prst="rect">
             <a:avLst/>
@@ -8073,7 +8204,7 @@
                                           </p:stCondLst>
                                         </p:cTn>
                                         <p:tgtEl>
-                                          <p:spTgt spid="3076"/>
+                                          <p:spTgt spid="1028"/>
                                         </p:tgtEl>
                                         <p:attrNameLst>
                                           <p:attrName>style.visibility</p:attrName>
@@ -8756,31 +8887,7 @@
             <a:pPr lvl="1"/>
             <a:r>
               <a:rPr lang="es-ES" dirty="0" err="1" smtClean="0"/>
-              <a:t>The</a:t>
-            </a:r>
-            <a:r>
-              <a:rPr lang="es-ES" dirty="0" smtClean="0"/>
-              <a:t> more complete </a:t>
-            </a:r>
-            <a:r>
-              <a:rPr lang="es-ES" dirty="0" err="1" smtClean="0"/>
-              <a:t>your</a:t>
-            </a:r>
-            <a:r>
-              <a:rPr lang="es-ES" dirty="0" smtClean="0"/>
-              <a:t> TDD </a:t>
-            </a:r>
-            <a:r>
-              <a:rPr lang="es-ES" dirty="0" err="1" smtClean="0"/>
-              <a:t>is</a:t>
-            </a:r>
-            <a:r>
-              <a:rPr lang="es-ES" dirty="0" smtClean="0"/>
-              <a:t>, </a:t>
-            </a:r>
-            <a:r>
-              <a:rPr lang="es-ES" dirty="0" err="1" smtClean="0"/>
-              <a:t>the</a:t>
+              <a:t>Think</a:t>
             </a:r>
             <a:r>
               <a:rPr lang="es-ES" dirty="0" smtClean="0"/>
@@ -8788,7 +8895,23 @@
             </a:r>
             <a:r>
               <a:rPr lang="es-ES" dirty="0" err="1" smtClean="0"/>
-              <a:t>less</a:t>
+              <a:t>about</a:t>
+            </a:r>
+            <a:r>
+              <a:rPr lang="es-ES" dirty="0" smtClean="0"/>
+              <a:t> new </a:t>
+            </a:r>
+            <a:r>
+              <a:rPr lang="es-ES" dirty="0" err="1" smtClean="0"/>
+              <a:t>sections</a:t>
+            </a:r>
+            <a:r>
+              <a:rPr lang="es-ES" dirty="0" smtClean="0"/>
+              <a:t> so I can </a:t>
+            </a:r>
+            <a:r>
+              <a:rPr lang="es-ES" dirty="0" err="1" smtClean="0"/>
+              <a:t>improve</a:t>
             </a:r>
             <a:r>
               <a:rPr lang="es-ES" dirty="0" smtClean="0"/>
@@ -8796,52 +8919,13 @@
             </a:r>
             <a:r>
               <a:rPr lang="es-ES" dirty="0" err="1" smtClean="0"/>
-              <a:t>explanations</a:t>
+              <a:t>my</a:t>
             </a:r>
             <a:r>
               <a:rPr lang="es-ES" dirty="0" smtClean="0"/>
-              <a:t> </a:t>
-            </a:r>
-            <a:r>
-              <a:rPr lang="es-ES" dirty="0" err="1" smtClean="0"/>
-              <a:t>you</a:t>
-            </a:r>
-            <a:r>
-              <a:rPr lang="es-ES" dirty="0" smtClean="0"/>
-              <a:t> </a:t>
-            </a:r>
-            <a:r>
-              <a:rPr lang="es-ES" dirty="0" err="1" smtClean="0"/>
-              <a:t>will</a:t>
-            </a:r>
-            <a:r>
-              <a:rPr lang="es-ES" dirty="0" smtClean="0"/>
-              <a:t> </a:t>
-            </a:r>
-            <a:r>
-              <a:rPr lang="es-ES" dirty="0" err="1" smtClean="0"/>
-              <a:t>need</a:t>
-            </a:r>
-            <a:r>
-              <a:rPr lang="es-ES" dirty="0" smtClean="0"/>
-              <a:t> to </a:t>
-            </a:r>
-            <a:r>
-              <a:rPr lang="es-ES" dirty="0" err="1" smtClean="0"/>
-              <a:t>give</a:t>
-            </a:r>
-            <a:r>
-              <a:rPr lang="es-ES" dirty="0" smtClean="0"/>
-              <a:t>, </a:t>
-            </a:r>
-            <a:r>
-              <a:rPr lang="es-ES" dirty="0" err="1" smtClean="0"/>
-              <a:t>but</a:t>
-            </a:r>
-            <a:r>
-              <a:rPr lang="es-ES" dirty="0" smtClean="0"/>
-              <a:t>…</a:t>
-            </a:r>
+              <a:t> page :)</a:t>
+            </a:r>
+            <a:endParaRPr lang="es-ES" dirty="0" smtClean="0"/>
           </a:p>
           <a:p>
             <a:pPr lvl="1"/>

</xml_diff>